<commit_message>
complete draft of all math content
</commit_message>
<xml_diff>
--- a/figures/info_matrix/fig.pptx
+++ b/figures/info_matrix/fig.pptx
@@ -261,7 +261,7 @@
           <a:p>
             <a:fld id="{03517940-F2CA-9741-9AB2-855BD2D1916E}" type="datetimeFigureOut">
               <a:rPr lang="en-US" smtClean="0"/>
-              <a:t>11/8/21</a:t>
+              <a:t>11/13/21</a:t>
             </a:fld>
             <a:endParaRPr lang="en-US"/>
           </a:p>
@@ -459,7 +459,7 @@
           <a:p>
             <a:fld id="{03517940-F2CA-9741-9AB2-855BD2D1916E}" type="datetimeFigureOut">
               <a:rPr lang="en-US" smtClean="0"/>
-              <a:t>11/8/21</a:t>
+              <a:t>11/13/21</a:t>
             </a:fld>
             <a:endParaRPr lang="en-US"/>
           </a:p>
@@ -667,7 +667,7 @@
           <a:p>
             <a:fld id="{03517940-F2CA-9741-9AB2-855BD2D1916E}" type="datetimeFigureOut">
               <a:rPr lang="en-US" smtClean="0"/>
-              <a:t>11/8/21</a:t>
+              <a:t>11/13/21</a:t>
             </a:fld>
             <a:endParaRPr lang="en-US"/>
           </a:p>
@@ -865,7 +865,7 @@
           <a:p>
             <a:fld id="{03517940-F2CA-9741-9AB2-855BD2D1916E}" type="datetimeFigureOut">
               <a:rPr lang="en-US" smtClean="0"/>
-              <a:t>11/8/21</a:t>
+              <a:t>11/13/21</a:t>
             </a:fld>
             <a:endParaRPr lang="en-US"/>
           </a:p>
@@ -1140,7 +1140,7 @@
           <a:p>
             <a:fld id="{03517940-F2CA-9741-9AB2-855BD2D1916E}" type="datetimeFigureOut">
               <a:rPr lang="en-US" smtClean="0"/>
-              <a:t>11/8/21</a:t>
+              <a:t>11/13/21</a:t>
             </a:fld>
             <a:endParaRPr lang="en-US"/>
           </a:p>
@@ -1405,7 +1405,7 @@
           <a:p>
             <a:fld id="{03517940-F2CA-9741-9AB2-855BD2D1916E}" type="datetimeFigureOut">
               <a:rPr lang="en-US" smtClean="0"/>
-              <a:t>11/8/21</a:t>
+              <a:t>11/13/21</a:t>
             </a:fld>
             <a:endParaRPr lang="en-US"/>
           </a:p>
@@ -1817,7 +1817,7 @@
           <a:p>
             <a:fld id="{03517940-F2CA-9741-9AB2-855BD2D1916E}" type="datetimeFigureOut">
               <a:rPr lang="en-US" smtClean="0"/>
-              <a:t>11/8/21</a:t>
+              <a:t>11/13/21</a:t>
             </a:fld>
             <a:endParaRPr lang="en-US"/>
           </a:p>
@@ -1958,7 +1958,7 @@
           <a:p>
             <a:fld id="{03517940-F2CA-9741-9AB2-855BD2D1916E}" type="datetimeFigureOut">
               <a:rPr lang="en-US" smtClean="0"/>
-              <a:t>11/8/21</a:t>
+              <a:t>11/13/21</a:t>
             </a:fld>
             <a:endParaRPr lang="en-US"/>
           </a:p>
@@ -2071,7 +2071,7 @@
           <a:p>
             <a:fld id="{03517940-F2CA-9741-9AB2-855BD2D1916E}" type="datetimeFigureOut">
               <a:rPr lang="en-US" smtClean="0"/>
-              <a:t>11/8/21</a:t>
+              <a:t>11/13/21</a:t>
             </a:fld>
             <a:endParaRPr lang="en-US"/>
           </a:p>
@@ -2382,7 +2382,7 @@
           <a:p>
             <a:fld id="{03517940-F2CA-9741-9AB2-855BD2D1916E}" type="datetimeFigureOut">
               <a:rPr lang="en-US" smtClean="0"/>
-              <a:t>11/8/21</a:t>
+              <a:t>11/13/21</a:t>
             </a:fld>
             <a:endParaRPr lang="en-US"/>
           </a:p>
@@ -2670,7 +2670,7 @@
           <a:p>
             <a:fld id="{03517940-F2CA-9741-9AB2-855BD2D1916E}" type="datetimeFigureOut">
               <a:rPr lang="en-US" smtClean="0"/>
-              <a:t>11/8/21</a:t>
+              <a:t>11/13/21</a:t>
             </a:fld>
             <a:endParaRPr lang="en-US"/>
           </a:p>
@@ -2911,7 +2911,7 @@
           <a:p>
             <a:fld id="{03517940-F2CA-9741-9AB2-855BD2D1916E}" type="datetimeFigureOut">
               <a:rPr lang="en-US" smtClean="0"/>
-              <a:t>11/8/21</a:t>
+              <a:t>11/13/21</a:t>
             </a:fld>
             <a:endParaRPr lang="en-US"/>
           </a:p>
@@ -5159,8 +5159,8 @@
         </p:nvSpPr>
         <p:spPr>
           <a:xfrm>
-            <a:off x="2400455" y="2998961"/>
-            <a:ext cx="521297" cy="584775"/>
+            <a:off x="2445456" y="2991363"/>
+            <a:ext cx="417102" cy="584775"/>
           </a:xfrm>
           <a:prstGeom prst="rect">
             <a:avLst/>
@@ -5175,7 +5175,7 @@
           <a:p>
             <a:r>
               <a:rPr lang="en-US" sz="3200" dirty="0"/>
-              <a:t>VI</a:t>
+              <a:t>V</a:t>
             </a:r>
           </a:p>
         </p:txBody>
@@ -5194,8 +5194,8 @@
         </p:nvSpPr>
         <p:spPr>
           <a:xfrm>
-            <a:off x="2490398" y="4769428"/>
-            <a:ext cx="417102" cy="584775"/>
+            <a:off x="2445479" y="4777026"/>
+            <a:ext cx="521297" cy="584775"/>
           </a:xfrm>
           <a:prstGeom prst="rect">
             <a:avLst/>
@@ -5210,7 +5210,7 @@
           <a:p>
             <a:r>
               <a:rPr lang="en-US" sz="3200" dirty="0"/>
-              <a:t>V</a:t>
+              <a:t>VI</a:t>
             </a:r>
           </a:p>
         </p:txBody>

</xml_diff>